<commit_message>
Slide size changed to 16:9 ratio.
</commit_message>
<xml_diff>
--- a/APKSangbundelSamesteller/Output/Resources/Sjabloon.pptx
+++ b/APKSangbundelSamesteller/Output/Resources/Sjabloon.pptx
@@ -10,7 +10,7 @@
   <p:sldIdLst>
     <p:sldId id="297" r:id="rId2"/>
   </p:sldIdLst>
-  <p:sldSz cx="9144000" cy="6858000" type="screen4x3"/>
+  <p:sldSz cx="12192000" cy="6858000"/>
   <p:notesSz cx="6858000" cy="9144000"/>
   <p:defaultTextStyle>
     <a:defPPr>
@@ -110,12 +110,12 @@
   <p:extLst>
     <p:ext uri="{EFAFB233-063F-42B5-8137-9DF3F51BA10A}">
       <p15:sldGuideLst xmlns:p15="http://schemas.microsoft.com/office/powerpoint/2012/main">
-        <p15:guide id="1" orient="horz" pos="2160">
+        <p15:guide id="1" orient="horz" pos="2160" userDrawn="1">
           <p15:clr>
             <a:srgbClr val="A4A3A4"/>
           </p15:clr>
         </p15:guide>
-        <p15:guide id="2" pos="2880">
+        <p15:guide id="2" pos="3840" userDrawn="1">
           <p15:clr>
             <a:srgbClr val="A4A3A4"/>
           </p15:clr>
@@ -209,7 +209,7 @@
             <a:fld id="{EE782BCD-54B2-49A0-A372-C92DF997697F}" type="datetimeFigureOut">
               <a:rPr lang="en-ZA" smtClean="0"/>
               <a:pPr/>
-              <a:t>2021-08-19</a:t>
+              <a:t>2023/05/02</a:t>
             </a:fld>
             <a:endParaRPr lang="en-ZA"/>
           </a:p>
@@ -227,8 +227,8 @@
         </p:nvSpPr>
         <p:spPr>
           <a:xfrm>
-            <a:off x="1143000" y="685800"/>
-            <a:ext cx="4572000" cy="3429000"/>
+            <a:off x="381000" y="685800"/>
+            <a:ext cx="6096000" cy="3429000"/>
           </a:xfrm>
           <a:prstGeom prst="rect">
             <a:avLst/>
@@ -509,8 +509,8 @@
         </p:nvSpPr>
         <p:spPr>
           <a:xfrm>
-            <a:off x="685800" y="2130425"/>
-            <a:ext cx="7772400" cy="1470025"/>
+            <a:off x="914400" y="2130426"/>
+            <a:ext cx="10363200" cy="1470025"/>
           </a:xfrm>
         </p:spPr>
         <p:txBody>
@@ -537,8 +537,8 @@
         </p:nvSpPr>
         <p:spPr>
           <a:xfrm>
-            <a:off x="1371600" y="3886200"/>
-            <a:ext cx="6400800" cy="1752600"/>
+            <a:off x="1828800" y="3886200"/>
+            <a:ext cx="8534400" cy="1752600"/>
           </a:xfrm>
         </p:spPr>
         <p:txBody>
@@ -662,7 +662,7 @@
             <a:fld id="{F7685F6D-46E4-49C2-A5E0-98A33685C822}" type="datetimeFigureOut">
               <a:rPr lang="en-ZA" smtClean="0"/>
               <a:pPr/>
-              <a:t>2021-08-19</a:t>
+              <a:t>2023/05/02</a:t>
             </a:fld>
             <a:endParaRPr lang="en-ZA"/>
           </a:p>
@@ -829,7 +829,7 @@
             <a:fld id="{F7685F6D-46E4-49C2-A5E0-98A33685C822}" type="datetimeFigureOut">
               <a:rPr lang="en-ZA" smtClean="0"/>
               <a:pPr/>
-              <a:t>2021-08-19</a:t>
+              <a:t>2023/05/02</a:t>
             </a:fld>
             <a:endParaRPr lang="en-ZA"/>
           </a:p>
@@ -915,8 +915,8 @@
         </p:nvSpPr>
         <p:spPr>
           <a:xfrm>
-            <a:off x="6629400" y="274638"/>
-            <a:ext cx="2057400" cy="5851525"/>
+            <a:off x="8839200" y="274639"/>
+            <a:ext cx="2743200" cy="5851525"/>
           </a:xfrm>
         </p:spPr>
         <p:txBody>
@@ -943,8 +943,8 @@
         </p:nvSpPr>
         <p:spPr>
           <a:xfrm>
-            <a:off x="457200" y="274638"/>
-            <a:ext cx="6019800" cy="5851525"/>
+            <a:off x="609600" y="274639"/>
+            <a:ext cx="8026400" cy="5851525"/>
           </a:xfrm>
         </p:spPr>
         <p:txBody>
@@ -1006,7 +1006,7 @@
             <a:fld id="{F7685F6D-46E4-49C2-A5E0-98A33685C822}" type="datetimeFigureOut">
               <a:rPr lang="en-ZA" smtClean="0"/>
               <a:pPr/>
-              <a:t>2021-08-19</a:t>
+              <a:t>2023/05/02</a:t>
             </a:fld>
             <a:endParaRPr lang="en-ZA"/>
           </a:p>
@@ -1173,7 +1173,7 @@
             <a:fld id="{F7685F6D-46E4-49C2-A5E0-98A33685C822}" type="datetimeFigureOut">
               <a:rPr lang="en-ZA" smtClean="0"/>
               <a:pPr/>
-              <a:t>2021-08-19</a:t>
+              <a:t>2023/05/02</a:t>
             </a:fld>
             <a:endParaRPr lang="en-ZA"/>
           </a:p>
@@ -1259,8 +1259,8 @@
         </p:nvSpPr>
         <p:spPr>
           <a:xfrm>
-            <a:off x="722313" y="4406900"/>
-            <a:ext cx="7772400" cy="1362075"/>
+            <a:off x="963084" y="4406901"/>
+            <a:ext cx="10363200" cy="1362075"/>
           </a:xfrm>
         </p:spPr>
         <p:txBody>
@@ -1291,8 +1291,8 @@
         </p:nvSpPr>
         <p:spPr>
           <a:xfrm>
-            <a:off x="722313" y="2906713"/>
-            <a:ext cx="7772400" cy="1500187"/>
+            <a:off x="963084" y="2906713"/>
+            <a:ext cx="10363200" cy="1500187"/>
           </a:xfrm>
         </p:spPr>
         <p:txBody>
@@ -1416,7 +1416,7 @@
             <a:fld id="{F7685F6D-46E4-49C2-A5E0-98A33685C822}" type="datetimeFigureOut">
               <a:rPr lang="en-ZA" smtClean="0"/>
               <a:pPr/>
-              <a:t>2021-08-19</a:t>
+              <a:t>2023/05/02</a:t>
             </a:fld>
             <a:endParaRPr lang="en-ZA"/>
           </a:p>
@@ -1525,8 +1525,8 @@
         </p:nvSpPr>
         <p:spPr>
           <a:xfrm>
-            <a:off x="457200" y="1600200"/>
-            <a:ext cx="4038600" cy="4525963"/>
+            <a:off x="609600" y="1600201"/>
+            <a:ext cx="5384800" cy="4525963"/>
           </a:xfrm>
         </p:spPr>
         <p:txBody>
@@ -1610,8 +1610,8 @@
         </p:nvSpPr>
         <p:spPr>
           <a:xfrm>
-            <a:off x="4648200" y="1600200"/>
-            <a:ext cx="4038600" cy="4525963"/>
+            <a:off x="6197600" y="1600201"/>
+            <a:ext cx="5384800" cy="4525963"/>
           </a:xfrm>
         </p:spPr>
         <p:txBody>
@@ -1701,7 +1701,7 @@
             <a:fld id="{F7685F6D-46E4-49C2-A5E0-98A33685C822}" type="datetimeFigureOut">
               <a:rPr lang="en-ZA" smtClean="0"/>
               <a:pPr/>
-              <a:t>2021-08-19</a:t>
+              <a:t>2023/05/02</a:t>
             </a:fld>
             <a:endParaRPr lang="en-ZA"/>
           </a:p>
@@ -1814,8 +1814,8 @@
         </p:nvSpPr>
         <p:spPr>
           <a:xfrm>
-            <a:off x="457200" y="1535113"/>
-            <a:ext cx="4040188" cy="639762"/>
+            <a:off x="609600" y="1535113"/>
+            <a:ext cx="5386917" cy="639762"/>
           </a:xfrm>
         </p:spPr>
         <p:txBody>
@@ -1879,8 +1879,8 @@
         </p:nvSpPr>
         <p:spPr>
           <a:xfrm>
-            <a:off x="457200" y="2174875"/>
-            <a:ext cx="4040188" cy="3951288"/>
+            <a:off x="609600" y="2174875"/>
+            <a:ext cx="5386917" cy="3951288"/>
           </a:xfrm>
         </p:spPr>
         <p:txBody>
@@ -1964,8 +1964,8 @@
         </p:nvSpPr>
         <p:spPr>
           <a:xfrm>
-            <a:off x="4645025" y="1535113"/>
-            <a:ext cx="4041775" cy="639762"/>
+            <a:off x="6193368" y="1535113"/>
+            <a:ext cx="5389033" cy="639762"/>
           </a:xfrm>
         </p:spPr>
         <p:txBody>
@@ -2029,8 +2029,8 @@
         </p:nvSpPr>
         <p:spPr>
           <a:xfrm>
-            <a:off x="4645025" y="2174875"/>
-            <a:ext cx="4041775" cy="3951288"/>
+            <a:off x="6193368" y="2174875"/>
+            <a:ext cx="5389033" cy="3951288"/>
           </a:xfrm>
         </p:spPr>
         <p:txBody>
@@ -2120,7 +2120,7 @@
             <a:fld id="{F7685F6D-46E4-49C2-A5E0-98A33685C822}" type="datetimeFigureOut">
               <a:rPr lang="en-ZA" smtClean="0"/>
               <a:pPr/>
-              <a:t>2021-08-19</a:t>
+              <a:t>2023/05/02</a:t>
             </a:fld>
             <a:endParaRPr lang="en-ZA"/>
           </a:p>
@@ -2235,7 +2235,7 @@
             <a:fld id="{F7685F6D-46E4-49C2-A5E0-98A33685C822}" type="datetimeFigureOut">
               <a:rPr lang="en-ZA" smtClean="0"/>
               <a:pPr/>
-              <a:t>2021-08-19</a:t>
+              <a:t>2023/05/02</a:t>
             </a:fld>
             <a:endParaRPr lang="en-ZA"/>
           </a:p>
@@ -2327,7 +2327,7 @@
             <a:fld id="{F7685F6D-46E4-49C2-A5E0-98A33685C822}" type="datetimeFigureOut">
               <a:rPr lang="en-ZA" smtClean="0"/>
               <a:pPr/>
-              <a:t>2021-08-19</a:t>
+              <a:t>2023/05/02</a:t>
             </a:fld>
             <a:endParaRPr lang="en-ZA"/>
           </a:p>
@@ -2413,8 +2413,8 @@
         </p:nvSpPr>
         <p:spPr>
           <a:xfrm>
-            <a:off x="457200" y="273050"/>
-            <a:ext cx="3008313" cy="1162050"/>
+            <a:off x="609601" y="273050"/>
+            <a:ext cx="4011084" cy="1162050"/>
           </a:xfrm>
         </p:spPr>
         <p:txBody>
@@ -2445,8 +2445,8 @@
         </p:nvSpPr>
         <p:spPr>
           <a:xfrm>
-            <a:off x="3575050" y="273050"/>
-            <a:ext cx="5111750" cy="5853113"/>
+            <a:off x="4766733" y="273051"/>
+            <a:ext cx="6815667" cy="5853113"/>
           </a:xfrm>
         </p:spPr>
         <p:txBody>
@@ -2530,8 +2530,8 @@
         </p:nvSpPr>
         <p:spPr>
           <a:xfrm>
-            <a:off x="457200" y="1435100"/>
-            <a:ext cx="3008313" cy="4691063"/>
+            <a:off x="609601" y="1435101"/>
+            <a:ext cx="4011084" cy="4691063"/>
           </a:xfrm>
         </p:spPr>
         <p:txBody>
@@ -2601,7 +2601,7 @@
             <a:fld id="{F7685F6D-46E4-49C2-A5E0-98A33685C822}" type="datetimeFigureOut">
               <a:rPr lang="en-ZA" smtClean="0"/>
               <a:pPr/>
-              <a:t>2021-08-19</a:t>
+              <a:t>2023/05/02</a:t>
             </a:fld>
             <a:endParaRPr lang="en-ZA"/>
           </a:p>
@@ -2687,8 +2687,8 @@
         </p:nvSpPr>
         <p:spPr>
           <a:xfrm>
-            <a:off x="1792288" y="4800600"/>
-            <a:ext cx="5486400" cy="566738"/>
+            <a:off x="2389717" y="4800600"/>
+            <a:ext cx="7315200" cy="566738"/>
           </a:xfrm>
         </p:spPr>
         <p:txBody>
@@ -2719,8 +2719,8 @@
         </p:nvSpPr>
         <p:spPr>
           <a:xfrm>
-            <a:off x="1792288" y="612775"/>
-            <a:ext cx="5486400" cy="4114800"/>
+            <a:off x="2389717" y="612775"/>
+            <a:ext cx="7315200" cy="4114800"/>
           </a:xfrm>
         </p:spPr>
         <p:txBody>
@@ -2780,8 +2780,8 @@
         </p:nvSpPr>
         <p:spPr>
           <a:xfrm>
-            <a:off x="1792288" y="5367338"/>
-            <a:ext cx="5486400" cy="804862"/>
+            <a:off x="2389717" y="5367338"/>
+            <a:ext cx="7315200" cy="804862"/>
           </a:xfrm>
         </p:spPr>
         <p:txBody>
@@ -2851,7 +2851,7 @@
             <a:fld id="{F7685F6D-46E4-49C2-A5E0-98A33685C822}" type="datetimeFigureOut">
               <a:rPr lang="en-ZA" smtClean="0"/>
               <a:pPr/>
-              <a:t>2021-08-19</a:t>
+              <a:t>2023/05/02</a:t>
             </a:fld>
             <a:endParaRPr lang="en-ZA"/>
           </a:p>
@@ -2942,8 +2942,8 @@
         </p:nvSpPr>
         <p:spPr>
           <a:xfrm>
-            <a:off x="457200" y="274638"/>
-            <a:ext cx="8229600" cy="1143000"/>
+            <a:off x="609600" y="274638"/>
+            <a:ext cx="10972800" cy="1143000"/>
           </a:xfrm>
           <a:prstGeom prst="rect">
             <a:avLst/>
@@ -2975,8 +2975,8 @@
         </p:nvSpPr>
         <p:spPr>
           <a:xfrm>
-            <a:off x="457200" y="1600200"/>
-            <a:ext cx="8229600" cy="4525963"/>
+            <a:off x="609600" y="1600201"/>
+            <a:ext cx="10972800" cy="4525963"/>
           </a:xfrm>
           <a:prstGeom prst="rect">
             <a:avLst/>
@@ -3037,8 +3037,8 @@
         </p:nvSpPr>
         <p:spPr>
           <a:xfrm>
-            <a:off x="457200" y="6356350"/>
-            <a:ext cx="2133600" cy="365125"/>
+            <a:off x="609600" y="6356351"/>
+            <a:ext cx="2844800" cy="365125"/>
           </a:xfrm>
           <a:prstGeom prst="rect">
             <a:avLst/>
@@ -3061,7 +3061,7 @@
             <a:fld id="{F7685F6D-46E4-49C2-A5E0-98A33685C822}" type="datetimeFigureOut">
               <a:rPr lang="en-ZA" smtClean="0"/>
               <a:pPr/>
-              <a:t>2021-08-19</a:t>
+              <a:t>2023/05/02</a:t>
             </a:fld>
             <a:endParaRPr lang="en-ZA"/>
           </a:p>
@@ -3079,8 +3079,8 @@
         </p:nvSpPr>
         <p:spPr>
           <a:xfrm>
-            <a:off x="3124200" y="6356350"/>
-            <a:ext cx="2895600" cy="365125"/>
+            <a:off x="4165600" y="6356351"/>
+            <a:ext cx="3860800" cy="365125"/>
           </a:xfrm>
           <a:prstGeom prst="rect">
             <a:avLst/>
@@ -3116,8 +3116,8 @@
         </p:nvSpPr>
         <p:spPr>
           <a:xfrm>
-            <a:off x="6553200" y="6356350"/>
-            <a:ext cx="2133600" cy="365125"/>
+            <a:off x="8737600" y="6356351"/>
+            <a:ext cx="2844800" cy="365125"/>
           </a:xfrm>
           <a:prstGeom prst="rect">
             <a:avLst/>

</xml_diff>